<commit_message>
-refactor(fuzzer): Fuzz-Once now runs in worker thread and returns result immediately to webview -doc(webview): New fuzzie logo, metro style
</commit_message>
<xml_diff>
--- a/doc/fuzzie-logo-designer.pptx
+++ b/doc/fuzzie-logo-designer.pptx
@@ -261,7 +261,7 @@
           <a:p>
             <a:fld id="{52C3A304-27EB-4776-9D0D-388CB1BF1C71}" type="datetimeFigureOut">
               <a:rPr lang="en-SG" smtClean="0"/>
-              <a:t>7/1/2023</a:t>
+              <a:t>17/2/2023</a:t>
             </a:fld>
             <a:endParaRPr lang="en-SG"/>
           </a:p>
@@ -461,7 +461,7 @@
           <a:p>
             <a:fld id="{52C3A304-27EB-4776-9D0D-388CB1BF1C71}" type="datetimeFigureOut">
               <a:rPr lang="en-SG" smtClean="0"/>
-              <a:t>7/1/2023</a:t>
+              <a:t>17/2/2023</a:t>
             </a:fld>
             <a:endParaRPr lang="en-SG"/>
           </a:p>
@@ -671,7 +671,7 @@
           <a:p>
             <a:fld id="{52C3A304-27EB-4776-9D0D-388CB1BF1C71}" type="datetimeFigureOut">
               <a:rPr lang="en-SG" smtClean="0"/>
-              <a:t>7/1/2023</a:t>
+              <a:t>17/2/2023</a:t>
             </a:fld>
             <a:endParaRPr lang="en-SG"/>
           </a:p>
@@ -871,7 +871,7 @@
           <a:p>
             <a:fld id="{52C3A304-27EB-4776-9D0D-388CB1BF1C71}" type="datetimeFigureOut">
               <a:rPr lang="en-SG" smtClean="0"/>
-              <a:t>7/1/2023</a:t>
+              <a:t>17/2/2023</a:t>
             </a:fld>
             <a:endParaRPr lang="en-SG"/>
           </a:p>
@@ -1147,7 +1147,7 @@
           <a:p>
             <a:fld id="{52C3A304-27EB-4776-9D0D-388CB1BF1C71}" type="datetimeFigureOut">
               <a:rPr lang="en-SG" smtClean="0"/>
-              <a:t>7/1/2023</a:t>
+              <a:t>17/2/2023</a:t>
             </a:fld>
             <a:endParaRPr lang="en-SG"/>
           </a:p>
@@ -1415,7 +1415,7 @@
           <a:p>
             <a:fld id="{52C3A304-27EB-4776-9D0D-388CB1BF1C71}" type="datetimeFigureOut">
               <a:rPr lang="en-SG" smtClean="0"/>
-              <a:t>7/1/2023</a:t>
+              <a:t>17/2/2023</a:t>
             </a:fld>
             <a:endParaRPr lang="en-SG"/>
           </a:p>
@@ -1830,7 +1830,7 @@
           <a:p>
             <a:fld id="{52C3A304-27EB-4776-9D0D-388CB1BF1C71}" type="datetimeFigureOut">
               <a:rPr lang="en-SG" smtClean="0"/>
-              <a:t>7/1/2023</a:t>
+              <a:t>17/2/2023</a:t>
             </a:fld>
             <a:endParaRPr lang="en-SG"/>
           </a:p>
@@ -1972,7 +1972,7 @@
           <a:p>
             <a:fld id="{52C3A304-27EB-4776-9D0D-388CB1BF1C71}" type="datetimeFigureOut">
               <a:rPr lang="en-SG" smtClean="0"/>
-              <a:t>7/1/2023</a:t>
+              <a:t>17/2/2023</a:t>
             </a:fld>
             <a:endParaRPr lang="en-SG"/>
           </a:p>
@@ -2085,7 +2085,7 @@
           <a:p>
             <a:fld id="{52C3A304-27EB-4776-9D0D-388CB1BF1C71}" type="datetimeFigureOut">
               <a:rPr lang="en-SG" smtClean="0"/>
-              <a:t>7/1/2023</a:t>
+              <a:t>17/2/2023</a:t>
             </a:fld>
             <a:endParaRPr lang="en-SG"/>
           </a:p>
@@ -2398,7 +2398,7 @@
           <a:p>
             <a:fld id="{52C3A304-27EB-4776-9D0D-388CB1BF1C71}" type="datetimeFigureOut">
               <a:rPr lang="en-SG" smtClean="0"/>
-              <a:t>7/1/2023</a:t>
+              <a:t>17/2/2023</a:t>
             </a:fld>
             <a:endParaRPr lang="en-SG"/>
           </a:p>
@@ -2687,7 +2687,7 @@
           <a:p>
             <a:fld id="{52C3A304-27EB-4776-9D0D-388CB1BF1C71}" type="datetimeFigureOut">
               <a:rPr lang="en-SG" smtClean="0"/>
-              <a:t>7/1/2023</a:t>
+              <a:t>17/2/2023</a:t>
             </a:fld>
             <a:endParaRPr lang="en-SG"/>
           </a:p>
@@ -2930,7 +2930,7 @@
           <a:p>
             <a:fld id="{52C3A304-27EB-4776-9D0D-388CB1BF1C71}" type="datetimeFigureOut">
               <a:rPr lang="en-SG" smtClean="0"/>
-              <a:t>7/1/2023</a:t>
+              <a:t>17/2/2023</a:t>
             </a:fld>
             <a:endParaRPr lang="en-SG"/>
           </a:p>
@@ -3621,7 +3621,7 @@
         </p:nvSpPr>
         <p:spPr>
           <a:xfrm>
-            <a:off x="4780183" y="539935"/>
+            <a:off x="7399121" y="590323"/>
             <a:ext cx="2348564" cy="1938992"/>
           </a:xfrm>
           <a:prstGeom prst="rect">
@@ -3637,12 +3637,9 @@
           <a:p>
             <a:r>
               <a:rPr lang="en-SG" sz="12000" dirty="0">
-                <a:solidFill>
-                  <a:srgbClr val="00FFFF"/>
-                </a:solidFill>
                 <a:latin typeface="Split splat splodge" panose="020B0800000000000000" pitchFamily="34" charset="0"/>
               </a:rPr>
-              <a:t>p</a:t>
+              <a:t>s</a:t>
             </a:r>
           </a:p>
         </p:txBody>
@@ -3661,8 +3658,8 @@
         </p:nvSpPr>
         <p:spPr>
           <a:xfrm>
-            <a:off x="5606923" y="1242760"/>
-            <a:ext cx="978153" cy="353943"/>
+            <a:off x="8253606" y="1389114"/>
+            <a:ext cx="755335" cy="353943"/>
           </a:xfrm>
           <a:prstGeom prst="rect">
             <a:avLst/>
@@ -3677,24 +3674,13 @@
           <a:p>
             <a:r>
               <a:rPr lang="en-SG" sz="1700" dirty="0">
-                <a:latin typeface="Overdrive Sunset" panose="02000500000000000000" pitchFamily="2" charset="0"/>
-                <a:cs typeface="Segoe UI" panose="020B0502040204020203" pitchFamily="34" charset="0"/>
+                <a:solidFill>
+                  <a:srgbClr val="00FFFF"/>
+                </a:solidFill>
+                <a:latin typeface="Arial" panose="020B0604020202020204" pitchFamily="34" charset="0"/>
+                <a:cs typeface="Arial" panose="020B0604020202020204" pitchFamily="34" charset="0"/>
               </a:rPr>
-              <a:t>F u z </a:t>
-            </a:r>
-            <a:r>
-              <a:rPr lang="en-SG" sz="1700" dirty="0" err="1">
-                <a:latin typeface="Overdrive Sunset" panose="02000500000000000000" pitchFamily="2" charset="0"/>
-                <a:cs typeface="Segoe UI" panose="020B0502040204020203" pitchFamily="34" charset="0"/>
-              </a:rPr>
-              <a:t>z</a:t>
-            </a:r>
-            <a:r>
-              <a:rPr lang="en-SG" sz="1700" dirty="0">
-                <a:latin typeface="Overdrive Sunset" panose="02000500000000000000" pitchFamily="2" charset="0"/>
-                <a:cs typeface="Segoe UI" panose="020B0502040204020203" pitchFamily="34" charset="0"/>
-              </a:rPr>
-              <a:t> I e</a:t>
+              <a:t>fuzzie</a:t>
             </a:r>
           </a:p>
         </p:txBody>
@@ -3784,6 +3770,145 @@
               </a:rPr>
               <a:t>Fuzzie</a:t>
             </a:r>
+          </a:p>
+        </p:txBody>
+      </p:sp>
+      <p:sp>
+        <p:nvSpPr>
+          <p:cNvPr id="8" name="Rectangle 7">
+            <a:extLst>
+              <a:ext uri="{FF2B5EF4-FFF2-40B4-BE49-F238E27FC236}">
+                <a16:creationId xmlns:a16="http://schemas.microsoft.com/office/drawing/2014/main" id="{C0BE8B2A-6713-B3E8-F45A-9292896046E3}"/>
+              </a:ext>
+            </a:extLst>
+          </p:cNvPr>
+          <p:cNvSpPr/>
+          <p:nvPr/>
+        </p:nvSpPr>
+        <p:spPr>
+          <a:xfrm>
+            <a:off x="351322" y="1389113"/>
+            <a:ext cx="1304223" cy="786195"/>
+          </a:xfrm>
+          <a:prstGeom prst="rect">
+            <a:avLst/>
+          </a:prstGeom>
+          <a:solidFill>
+            <a:srgbClr val="002060"/>
+          </a:solidFill>
+          <a:ln>
+            <a:solidFill>
+              <a:schemeClr val="bg1"/>
+            </a:solidFill>
+          </a:ln>
+        </p:spPr>
+        <p:style>
+          <a:lnRef idx="2">
+            <a:schemeClr val="accent1">
+              <a:shade val="50000"/>
+            </a:schemeClr>
+          </a:lnRef>
+          <a:fillRef idx="1">
+            <a:schemeClr val="accent1"/>
+          </a:fillRef>
+          <a:effectRef idx="0">
+            <a:schemeClr val="accent1"/>
+          </a:effectRef>
+          <a:fontRef idx="minor">
+            <a:schemeClr val="lt1"/>
+          </a:fontRef>
+        </p:style>
+        <p:txBody>
+          <a:bodyPr rtlCol="0" anchor="ctr"/>
+          <a:lstStyle/>
+          <a:p>
+            <a:pPr algn="ctr"/>
+            <a:endParaRPr lang="en-SG"/>
+          </a:p>
+        </p:txBody>
+      </p:sp>
+      <p:sp>
+        <p:nvSpPr>
+          <p:cNvPr id="9" name="TextBox 8">
+            <a:extLst>
+              <a:ext uri="{FF2B5EF4-FFF2-40B4-BE49-F238E27FC236}">
+                <a16:creationId xmlns:a16="http://schemas.microsoft.com/office/drawing/2014/main" id="{2F58A523-B871-BE98-25C0-A701E11B5EC3}"/>
+              </a:ext>
+            </a:extLst>
+          </p:cNvPr>
+          <p:cNvSpPr txBox="1"/>
+          <p:nvPr/>
+        </p:nvSpPr>
+        <p:spPr>
+          <a:xfrm>
+            <a:off x="893497" y="1821805"/>
+            <a:ext cx="816249" cy="400110"/>
+          </a:xfrm>
+          <a:prstGeom prst="rect">
+            <a:avLst/>
+          </a:prstGeom>
+          <a:noFill/>
+        </p:spPr>
+        <p:txBody>
+          <a:bodyPr wrap="none" rtlCol="0">
+            <a:spAutoFit/>
+          </a:bodyPr>
+          <a:lstStyle/>
+          <a:p>
+            <a:r>
+              <a:rPr lang="en-US" sz="2000" dirty="0">
+                <a:solidFill>
+                  <a:srgbClr val="00FFFF"/>
+                </a:solidFill>
+                <a:latin typeface="Metrostyle" panose="020B0504020202050204" pitchFamily="34" charset="0"/>
+                <a:cs typeface="Arial" panose="020B0604020202020204" pitchFamily="34" charset="0"/>
+              </a:rPr>
+              <a:t>f</a:t>
+            </a:r>
+            <a:r>
+              <a:rPr lang="en-SG" sz="2000" dirty="0">
+                <a:solidFill>
+                  <a:srgbClr val="00FFFF"/>
+                </a:solidFill>
+                <a:latin typeface="Metrostyle" panose="020B0504020202050204" pitchFamily="34" charset="0"/>
+                <a:cs typeface="Arial" panose="020B0604020202020204" pitchFamily="34" charset="0"/>
+              </a:rPr>
+              <a:t>uzzie</a:t>
+            </a:r>
+          </a:p>
+        </p:txBody>
+      </p:sp>
+      <p:sp>
+        <p:nvSpPr>
+          <p:cNvPr id="11" name="TextBox 10">
+            <a:extLst>
+              <a:ext uri="{FF2B5EF4-FFF2-40B4-BE49-F238E27FC236}">
+                <a16:creationId xmlns:a16="http://schemas.microsoft.com/office/drawing/2014/main" id="{1F38BF23-BB2B-B5A0-F4D3-A9DEEB2901B2}"/>
+              </a:ext>
+            </a:extLst>
+          </p:cNvPr>
+          <p:cNvSpPr txBox="1"/>
+          <p:nvPr/>
+        </p:nvSpPr>
+        <p:spPr>
+          <a:xfrm>
+            <a:off x="4134867" y="1087655"/>
+            <a:ext cx="184731" cy="369332"/>
+          </a:xfrm>
+          <a:prstGeom prst="rect">
+            <a:avLst/>
+          </a:prstGeom>
+          <a:noFill/>
+        </p:spPr>
+        <p:txBody>
+          <a:bodyPr wrap="none" rtlCol="0">
+            <a:spAutoFit/>
+          </a:bodyPr>
+          <a:lstStyle/>
+          <a:p>
+            <a:endParaRPr lang="en-SG" dirty="0">
+              <a:latin typeface="Metrostyle" panose="020B0504020202050204" pitchFamily="34" charset="0"/>
+            </a:endParaRPr>
           </a:p>
         </p:txBody>
       </p:sp>

</xml_diff>